<commit_message>
feat(fig01): make line thickness 3pt
</commit_message>
<xml_diff>
--- a/output/figures/fig01-schematic-households.pptx
+++ b/output/figures/fig01-schematic-households.pptx
@@ -3360,14 +3360,14 @@
         </p:nvSpPr>
         <p:spPr>
           <a:xfrm>
-            <a:off x="4241763" y="2743200"/>
+            <a:off x="3055137" y="2394192"/>
             <a:ext cx="1371600" cy="1371600"/>
           </a:xfrm>
           <a:prstGeom prst="rect">
             <a:avLst/>
           </a:prstGeom>
           <a:noFill/>
-          <a:ln>
+          <a:ln w="38100">
             <a:solidFill>
               <a:schemeClr val="tx1"/>
             </a:solidFill>
@@ -3412,14 +3412,14 @@
         </p:nvSpPr>
         <p:spPr>
           <a:xfrm>
-            <a:off x="8400189" y="2743200"/>
+            <a:off x="7213563" y="2394192"/>
             <a:ext cx="1371600" cy="1371600"/>
           </a:xfrm>
           <a:prstGeom prst="rect">
             <a:avLst/>
           </a:prstGeom>
           <a:noFill/>
-          <a:ln>
+          <a:ln w="38100">
             <a:solidFill>
               <a:schemeClr val="tx1"/>
             </a:solidFill>
@@ -3464,14 +3464,14 @@
         </p:nvSpPr>
         <p:spPr>
           <a:xfrm>
-            <a:off x="6542305" y="2743200"/>
+            <a:off x="5355679" y="2394192"/>
             <a:ext cx="1371600" cy="1371600"/>
           </a:xfrm>
           <a:prstGeom prst="rect">
             <a:avLst/>
           </a:prstGeom>
           <a:noFill/>
-          <a:ln>
+          <a:ln w="38100">
             <a:solidFill>
               <a:schemeClr val="tx1"/>
             </a:solidFill>
@@ -3516,14 +3516,14 @@
         </p:nvSpPr>
         <p:spPr>
           <a:xfrm>
-            <a:off x="10258073" y="2743200"/>
+            <a:off x="9071447" y="2394192"/>
             <a:ext cx="1371600" cy="1371600"/>
           </a:xfrm>
           <a:prstGeom prst="rect">
             <a:avLst/>
           </a:prstGeom>
           <a:noFill/>
-          <a:ln>
+          <a:ln w="38100">
             <a:solidFill>
               <a:schemeClr val="tx1"/>
             </a:solidFill>
@@ -3568,14 +3568,14 @@
         </p:nvSpPr>
         <p:spPr>
           <a:xfrm>
-            <a:off x="2383879" y="2743200"/>
+            <a:off x="1197253" y="2394192"/>
             <a:ext cx="1371600" cy="1371600"/>
           </a:xfrm>
           <a:prstGeom prst="rect">
             <a:avLst/>
           </a:prstGeom>
           <a:noFill/>
-          <a:ln>
+          <a:ln w="38100">
             <a:solidFill>
               <a:schemeClr val="tx1"/>
             </a:solidFill>
@@ -3620,14 +3620,14 @@
         </p:nvSpPr>
         <p:spPr>
           <a:xfrm>
-            <a:off x="1972609" y="1940484"/>
+            <a:off x="785983" y="1591476"/>
             <a:ext cx="4114800" cy="2598942"/>
           </a:xfrm>
           <a:prstGeom prst="rect">
             <a:avLst/>
           </a:prstGeom>
           <a:noFill/>
-          <a:ln>
+          <a:ln w="38100">
             <a:solidFill>
               <a:schemeClr val="tx1"/>
             </a:solidFill>
@@ -3672,14 +3672,14 @@
         </p:nvSpPr>
         <p:spPr>
           <a:xfrm>
-            <a:off x="6087409" y="1940484"/>
+            <a:off x="4900783" y="1591476"/>
             <a:ext cx="6044096" cy="2598942"/>
           </a:xfrm>
           <a:prstGeom prst="rect">
             <a:avLst/>
           </a:prstGeom>
           <a:noFill/>
-          <a:ln>
+          <a:ln w="38100">
             <a:solidFill>
               <a:schemeClr val="tx1"/>
             </a:solidFill>
@@ -3724,7 +3724,7 @@
         </p:nvSpPr>
         <p:spPr>
           <a:xfrm>
-            <a:off x="2644110" y="3472486"/>
+            <a:off x="1457484" y="3123478"/>
             <a:ext cx="301752" cy="301752"/>
           </a:xfrm>
           <a:prstGeom prst="ellipse">
@@ -3735,7 +3735,7 @@
               <a:lumMod val="75000"/>
             </a:schemeClr>
           </a:solidFill>
-          <a:ln>
+          <a:ln w="38100">
             <a:solidFill>
               <a:schemeClr val="tx1"/>
             </a:solidFill>
@@ -3780,7 +3780,7 @@
         </p:nvSpPr>
         <p:spPr>
           <a:xfrm>
-            <a:off x="3185153" y="3472486"/>
+            <a:off x="1998527" y="3123478"/>
             <a:ext cx="301752" cy="301752"/>
           </a:xfrm>
           <a:prstGeom prst="ellipse">
@@ -3791,7 +3791,7 @@
               <a:lumMod val="75000"/>
             </a:schemeClr>
           </a:solidFill>
-          <a:ln>
+          <a:ln w="38100">
             <a:solidFill>
               <a:schemeClr val="tx1"/>
             </a:solidFill>
@@ -3836,7 +3836,7 @@
         </p:nvSpPr>
         <p:spPr>
           <a:xfrm>
-            <a:off x="2904219" y="3005980"/>
+            <a:off x="1717593" y="2656972"/>
             <a:ext cx="301752" cy="301752"/>
           </a:xfrm>
           <a:prstGeom prst="ellipse">
@@ -3847,7 +3847,7 @@
               <a:lumMod val="75000"/>
             </a:schemeClr>
           </a:solidFill>
-          <a:ln>
+          <a:ln w="38100">
             <a:solidFill>
               <a:schemeClr val="tx1"/>
             </a:solidFill>
@@ -3892,7 +3892,7 @@
         </p:nvSpPr>
         <p:spPr>
           <a:xfrm>
-            <a:off x="4486840" y="3470461"/>
+            <a:off x="3300214" y="3121453"/>
             <a:ext cx="301752" cy="301752"/>
           </a:xfrm>
           <a:prstGeom prst="ellipse">
@@ -3903,7 +3903,7 @@
               <a:lumMod val="75000"/>
             </a:schemeClr>
           </a:solidFill>
-          <a:ln>
+          <a:ln w="38100">
             <a:solidFill>
               <a:schemeClr val="tx1"/>
             </a:solidFill>
@@ -3948,7 +3948,7 @@
         </p:nvSpPr>
         <p:spPr>
           <a:xfrm>
-            <a:off x="5027883" y="3470461"/>
+            <a:off x="3841257" y="3121453"/>
             <a:ext cx="301752" cy="301752"/>
           </a:xfrm>
           <a:prstGeom prst="ellipse">
@@ -3959,7 +3959,7 @@
               <a:lumMod val="75000"/>
             </a:schemeClr>
           </a:solidFill>
-          <a:ln>
+          <a:ln w="38100">
             <a:solidFill>
               <a:schemeClr val="tx1"/>
             </a:solidFill>
@@ -4004,7 +4004,7 @@
         </p:nvSpPr>
         <p:spPr>
           <a:xfrm>
-            <a:off x="4746949" y="3003955"/>
+            <a:off x="3560323" y="2654947"/>
             <a:ext cx="301752" cy="301752"/>
           </a:xfrm>
           <a:prstGeom prst="ellipse">
@@ -4015,7 +4015,7 @@
               <a:lumMod val="75000"/>
             </a:schemeClr>
           </a:solidFill>
-          <a:ln>
+          <a:ln w="38100">
             <a:solidFill>
               <a:schemeClr val="tx1"/>
             </a:solidFill>
@@ -4060,7 +4060,7 @@
         </p:nvSpPr>
         <p:spPr>
           <a:xfrm>
-            <a:off x="6824249" y="3529991"/>
+            <a:off x="5637623" y="3180983"/>
             <a:ext cx="301752" cy="301752"/>
           </a:xfrm>
           <a:prstGeom prst="ellipse">
@@ -4071,7 +4071,7 @@
               <a:lumMod val="75000"/>
             </a:schemeClr>
           </a:solidFill>
-          <a:ln>
+          <a:ln w="38100">
             <a:solidFill>
               <a:schemeClr val="tx1"/>
             </a:solidFill>
@@ -4116,7 +4116,7 @@
         </p:nvSpPr>
         <p:spPr>
           <a:xfrm>
-            <a:off x="7327751" y="3529991"/>
+            <a:off x="6141125" y="3180983"/>
             <a:ext cx="301752" cy="301752"/>
           </a:xfrm>
           <a:prstGeom prst="ellipse">
@@ -4127,7 +4127,7 @@
               <a:lumMod val="75000"/>
             </a:schemeClr>
           </a:solidFill>
-          <a:ln>
+          <a:ln w="38100">
             <a:solidFill>
               <a:schemeClr val="tx1"/>
             </a:solidFill>
@@ -4172,7 +4172,7 @@
         </p:nvSpPr>
         <p:spPr>
           <a:xfrm>
-            <a:off x="6831229" y="3038855"/>
+            <a:off x="5644603" y="2689847"/>
             <a:ext cx="301752" cy="301752"/>
           </a:xfrm>
           <a:prstGeom prst="ellipse">
@@ -4183,7 +4183,7 @@
               <a:lumMod val="75000"/>
             </a:schemeClr>
           </a:solidFill>
-          <a:ln>
+          <a:ln w="38100">
             <a:solidFill>
               <a:schemeClr val="tx1"/>
             </a:solidFill>
@@ -4228,7 +4228,7 @@
         </p:nvSpPr>
         <p:spPr>
           <a:xfrm>
-            <a:off x="7313791" y="3031875"/>
+            <a:off x="6127165" y="2682867"/>
             <a:ext cx="301752" cy="301752"/>
           </a:xfrm>
           <a:prstGeom prst="ellipse">
@@ -4239,7 +4239,7 @@
               <a:lumMod val="75000"/>
             </a:schemeClr>
           </a:solidFill>
-          <a:ln>
+          <a:ln w="38100">
             <a:solidFill>
               <a:schemeClr val="tx1"/>
             </a:solidFill>
@@ -4284,7 +4284,7 @@
         </p:nvSpPr>
         <p:spPr>
           <a:xfrm>
-            <a:off x="8933517" y="3278124"/>
+            <a:off x="7746891" y="2929116"/>
             <a:ext cx="301752" cy="301752"/>
           </a:xfrm>
           <a:prstGeom prst="ellipse">
@@ -4295,7 +4295,7 @@
               <a:lumMod val="75000"/>
             </a:schemeClr>
           </a:solidFill>
-          <a:ln>
+          <a:ln w="38100">
             <a:solidFill>
               <a:schemeClr val="tx1"/>
             </a:solidFill>
@@ -4340,7 +4340,7 @@
         </p:nvSpPr>
         <p:spPr>
           <a:xfrm>
-            <a:off x="10792997" y="3297702"/>
+            <a:off x="9606371" y="2948694"/>
             <a:ext cx="301752" cy="301752"/>
           </a:xfrm>
           <a:prstGeom prst="ellipse">
@@ -4351,7 +4351,7 @@
               <a:lumMod val="75000"/>
             </a:schemeClr>
           </a:solidFill>
-          <a:ln>
+          <a:ln w="38100">
             <a:solidFill>
               <a:schemeClr val="tx1"/>
             </a:solidFill>
@@ -4382,8 +4382,8 @@
           </a:p>
         </p:txBody>
       </p:sp>
-      <mc:AlternateContent xmlns:mc="http://schemas.openxmlformats.org/markup-compatibility/2006">
-        <mc:Choice xmlns:a14="http://schemas.microsoft.com/office/drawing/2010/main" Requires="a14">
+      <mc:AlternateContent xmlns:mc="http://schemas.openxmlformats.org/markup-compatibility/2006" xmlns:a14="http://schemas.microsoft.com/office/drawing/2010/main">
+        <mc:Choice Requires="a14">
           <p:sp>
             <p:nvSpPr>
               <p:cNvPr id="21" name="TextBox 20">
@@ -4398,7 +4398,7 @@
             </p:nvSpPr>
             <p:spPr>
               <a:xfrm>
-                <a:off x="2393803" y="2096869"/>
+                <a:off x="1207177" y="1747861"/>
                 <a:ext cx="1371599" cy="646331"/>
               </a:xfrm>
               <a:prstGeom prst="rect">
@@ -4414,25 +4414,25 @@
               <a:p>
                 <a:pPr algn="ctr"/>
                 <a:r>
-                  <a:rPr lang="en-US" dirty="0"/>
+                  <a:rPr lang="en-US" b="1" dirty="0"/>
                   <a:t>Household </a:t>
                 </a:r>
                 <a14:m>
                   <m:oMath xmlns:m="http://schemas.openxmlformats.org/officeDocument/2006/math">
                     <m:r>
-                      <a:rPr lang="en-US" i="1" smtClean="0">
+                      <a:rPr lang="en-US" b="1" i="1" smtClean="0">
                         <a:latin typeface="Cambria Math" panose="02040503050406030204" pitchFamily="18" charset="0"/>
                       </a:rPr>
-                      <m:t>𝐴</m:t>
+                      <m:t>𝑨</m:t>
                     </m:r>
                   </m:oMath>
                 </a14:m>
-                <a:endParaRPr lang="en-US" dirty="0"/>
+                <a:endParaRPr lang="en-US" b="1" dirty="0"/>
               </a:p>
             </p:txBody>
           </p:sp>
         </mc:Choice>
-        <mc:Fallback>
+        <mc:Fallback xmlns="">
           <p:sp>
             <p:nvSpPr>
               <p:cNvPr id="21" name="TextBox 20">
@@ -4449,7 +4449,7 @@
             </p:nvSpPr>
             <p:spPr>
               <a:xfrm>
-                <a:off x="2393803" y="2096869"/>
+                <a:off x="1207177" y="1747861"/>
                 <a:ext cx="1371599" cy="646331"/>
               </a:xfrm>
               <a:prstGeom prst="rect">
@@ -4458,7 +4458,7 @@
               <a:blipFill>
                 <a:blip r:embed="rId2"/>
                 <a:stretch>
-                  <a:fillRect l="-889" t="-4717" r="-2222"/>
+                  <a:fillRect l="-2667" t="-4717" r="-4889"/>
                 </a:stretch>
               </a:blipFill>
             </p:spPr>
@@ -4477,8 +4477,8 @@
           </p:sp>
         </mc:Fallback>
       </mc:AlternateContent>
-      <mc:AlternateContent xmlns:mc="http://schemas.openxmlformats.org/markup-compatibility/2006">
-        <mc:Choice xmlns:a14="http://schemas.microsoft.com/office/drawing/2010/main" Requires="a14">
+      <mc:AlternateContent xmlns:mc="http://schemas.openxmlformats.org/markup-compatibility/2006" xmlns:a14="http://schemas.microsoft.com/office/drawing/2010/main">
+        <mc:Choice Requires="a14">
           <p:sp>
             <p:nvSpPr>
               <p:cNvPr id="22" name="TextBox 21">
@@ -4493,7 +4493,7 @@
             </p:nvSpPr>
             <p:spPr>
               <a:xfrm>
-                <a:off x="4251686" y="2091407"/>
+                <a:off x="3065060" y="1742399"/>
                 <a:ext cx="1371599" cy="646331"/>
               </a:xfrm>
               <a:prstGeom prst="rect">
@@ -4509,25 +4509,25 @@
               <a:p>
                 <a:pPr algn="ctr"/>
                 <a:r>
-                  <a:rPr lang="en-US" dirty="0"/>
+                  <a:rPr lang="en-US" b="1" dirty="0"/>
                   <a:t>Household </a:t>
                 </a:r>
                 <a14:m>
                   <m:oMath xmlns:m="http://schemas.openxmlformats.org/officeDocument/2006/math">
                     <m:r>
-                      <a:rPr lang="en-US" b="0" i="1" smtClean="0">
+                      <a:rPr lang="en-US" b="1" i="1" smtClean="0">
                         <a:latin typeface="Cambria Math" panose="02040503050406030204" pitchFamily="18" charset="0"/>
                       </a:rPr>
-                      <m:t>𝐵</m:t>
+                      <m:t>𝑩</m:t>
                     </m:r>
                   </m:oMath>
                 </a14:m>
-                <a:endParaRPr lang="en-US" dirty="0"/>
+                <a:endParaRPr lang="en-US" b="1" dirty="0"/>
               </a:p>
             </p:txBody>
           </p:sp>
         </mc:Choice>
-        <mc:Fallback>
+        <mc:Fallback xmlns="">
           <p:sp>
             <p:nvSpPr>
               <p:cNvPr id="22" name="TextBox 21">
@@ -4544,7 +4544,7 @@
             </p:nvSpPr>
             <p:spPr>
               <a:xfrm>
-                <a:off x="4251686" y="2091407"/>
+                <a:off x="3065060" y="1742399"/>
                 <a:ext cx="1371599" cy="646331"/>
               </a:xfrm>
               <a:prstGeom prst="rect">
@@ -4553,7 +4553,7 @@
               <a:blipFill>
                 <a:blip r:embed="rId3"/>
                 <a:stretch>
-                  <a:fillRect l="-444" t="-3774" r="-2667"/>
+                  <a:fillRect l="-3111" t="-4717" r="-4444"/>
                 </a:stretch>
               </a:blipFill>
             </p:spPr>
@@ -4572,8 +4572,8 @@
           </p:sp>
         </mc:Fallback>
       </mc:AlternateContent>
-      <mc:AlternateContent xmlns:mc="http://schemas.openxmlformats.org/markup-compatibility/2006">
-        <mc:Choice xmlns:a14="http://schemas.microsoft.com/office/drawing/2010/main" Requires="a14">
+      <mc:AlternateContent xmlns:mc="http://schemas.openxmlformats.org/markup-compatibility/2006" xmlns:a14="http://schemas.microsoft.com/office/drawing/2010/main">
+        <mc:Choice Requires="a14">
           <p:sp>
             <p:nvSpPr>
               <p:cNvPr id="23" name="TextBox 22">
@@ -4588,7 +4588,7 @@
             </p:nvSpPr>
             <p:spPr>
               <a:xfrm>
-                <a:off x="8401487" y="2096868"/>
+                <a:off x="7214861" y="1747860"/>
                 <a:ext cx="1371599" cy="646331"/>
               </a:xfrm>
               <a:prstGeom prst="rect">
@@ -4604,25 +4604,25 @@
               <a:p>
                 <a:pPr algn="ctr"/>
                 <a:r>
-                  <a:rPr lang="en-US" dirty="0"/>
+                  <a:rPr lang="en-US" b="1" dirty="0"/>
                   <a:t>Household </a:t>
                 </a:r>
                 <a14:m>
                   <m:oMath xmlns:m="http://schemas.openxmlformats.org/officeDocument/2006/math">
                     <m:r>
-                      <a:rPr lang="en-US" b="0" i="1" smtClean="0">
+                      <a:rPr lang="en-US" b="1" i="1" smtClean="0">
                         <a:latin typeface="Cambria Math" panose="02040503050406030204" pitchFamily="18" charset="0"/>
                       </a:rPr>
-                      <m:t>𝐵</m:t>
+                      <m:t>𝑩</m:t>
                     </m:r>
                   </m:oMath>
                 </a14:m>
-                <a:endParaRPr lang="en-US" dirty="0"/>
+                <a:endParaRPr lang="en-US" b="1" dirty="0"/>
               </a:p>
             </p:txBody>
           </p:sp>
         </mc:Choice>
-        <mc:Fallback>
+        <mc:Fallback xmlns="">
           <p:sp>
             <p:nvSpPr>
               <p:cNvPr id="23" name="TextBox 22">
@@ -4639,7 +4639,7 @@
             </p:nvSpPr>
             <p:spPr>
               <a:xfrm>
-                <a:off x="8401487" y="2096868"/>
+                <a:off x="7214861" y="1747860"/>
                 <a:ext cx="1371599" cy="646331"/>
               </a:xfrm>
               <a:prstGeom prst="rect">
@@ -4648,7 +4648,7 @@
               <a:blipFill>
                 <a:blip r:embed="rId4"/>
                 <a:stretch>
-                  <a:fillRect l="-444" t="-4717" r="-2667"/>
+                  <a:fillRect l="-3111" t="-4717" r="-4444"/>
                 </a:stretch>
               </a:blipFill>
             </p:spPr>
@@ -4667,8 +4667,8 @@
           </p:sp>
         </mc:Fallback>
       </mc:AlternateContent>
-      <mc:AlternateContent xmlns:mc="http://schemas.openxmlformats.org/markup-compatibility/2006">
-        <mc:Choice xmlns:a14="http://schemas.microsoft.com/office/drawing/2010/main" Requires="a14">
+      <mc:AlternateContent xmlns:mc="http://schemas.openxmlformats.org/markup-compatibility/2006" xmlns:a14="http://schemas.microsoft.com/office/drawing/2010/main">
+        <mc:Choice Requires="a14">
           <p:sp>
             <p:nvSpPr>
               <p:cNvPr id="24" name="TextBox 23">
@@ -4683,7 +4683,7 @@
             </p:nvSpPr>
             <p:spPr>
               <a:xfrm>
-                <a:off x="10252815" y="2100544"/>
+                <a:off x="9066189" y="1751536"/>
                 <a:ext cx="1371599" cy="646331"/>
               </a:xfrm>
               <a:prstGeom prst="rect">
@@ -4699,25 +4699,25 @@
               <a:p>
                 <a:pPr algn="ctr"/>
                 <a:r>
-                  <a:rPr lang="en-US" dirty="0"/>
+                  <a:rPr lang="en-US" b="1" dirty="0"/>
                   <a:t>Household </a:t>
                 </a:r>
                 <a14:m>
                   <m:oMath xmlns:m="http://schemas.openxmlformats.org/officeDocument/2006/math">
                     <m:r>
-                      <a:rPr lang="en-US" b="0" i="1" smtClean="0">
+                      <a:rPr lang="en-US" b="1" i="1" smtClean="0">
                         <a:latin typeface="Cambria Math" panose="02040503050406030204" pitchFamily="18" charset="0"/>
                       </a:rPr>
-                      <m:t>𝐶</m:t>
+                      <m:t>𝑪</m:t>
                     </m:r>
                   </m:oMath>
                 </a14:m>
-                <a:endParaRPr lang="en-US" dirty="0"/>
+                <a:endParaRPr lang="en-US" b="1" dirty="0"/>
               </a:p>
             </p:txBody>
           </p:sp>
         </mc:Choice>
-        <mc:Fallback>
+        <mc:Fallback xmlns="">
           <p:sp>
             <p:nvSpPr>
               <p:cNvPr id="24" name="TextBox 23">
@@ -4734,7 +4734,7 @@
             </p:nvSpPr>
             <p:spPr>
               <a:xfrm>
-                <a:off x="10252815" y="2100544"/>
+                <a:off x="9066189" y="1751536"/>
                 <a:ext cx="1371599" cy="646331"/>
               </a:xfrm>
               <a:prstGeom prst="rect">
@@ -4743,7 +4743,7 @@
               <a:blipFill>
                 <a:blip r:embed="rId5"/>
                 <a:stretch>
-                  <a:fillRect l="-444" t="-4717" r="-2667"/>
+                  <a:fillRect l="-2667" t="-3774" r="-4889"/>
                 </a:stretch>
               </a:blipFill>
             </p:spPr>
@@ -4762,8 +4762,8 @@
           </p:sp>
         </mc:Fallback>
       </mc:AlternateContent>
-      <mc:AlternateContent xmlns:mc="http://schemas.openxmlformats.org/markup-compatibility/2006">
-        <mc:Choice xmlns:a14="http://schemas.microsoft.com/office/drawing/2010/main" Requires="a14">
+      <mc:AlternateContent xmlns:mc="http://schemas.openxmlformats.org/markup-compatibility/2006" xmlns:a14="http://schemas.microsoft.com/office/drawing/2010/main">
+        <mc:Choice Requires="a14">
           <p:sp>
             <p:nvSpPr>
               <p:cNvPr id="25" name="TextBox 24">
@@ -4778,7 +4778,7 @@
             </p:nvSpPr>
             <p:spPr>
               <a:xfrm>
-                <a:off x="6541008" y="2105874"/>
+                <a:off x="5354382" y="1756866"/>
                 <a:ext cx="1371599" cy="646331"/>
               </a:xfrm>
               <a:prstGeom prst="rect">
@@ -4794,25 +4794,25 @@
               <a:p>
                 <a:pPr algn="ctr"/>
                 <a:r>
-                  <a:rPr lang="en-US" dirty="0"/>
+                  <a:rPr lang="en-US" b="1" dirty="0"/>
                   <a:t>Household </a:t>
                 </a:r>
                 <a14:m>
                   <m:oMath xmlns:m="http://schemas.openxmlformats.org/officeDocument/2006/math">
                     <m:r>
-                      <a:rPr lang="en-US" i="1" smtClean="0">
+                      <a:rPr lang="en-US" b="1" i="1" smtClean="0">
                         <a:latin typeface="Cambria Math" panose="02040503050406030204" pitchFamily="18" charset="0"/>
                       </a:rPr>
-                      <m:t>𝐴</m:t>
+                      <m:t>𝑨</m:t>
                     </m:r>
                   </m:oMath>
                 </a14:m>
-                <a:endParaRPr lang="en-US" dirty="0"/>
+                <a:endParaRPr lang="en-US" b="1" dirty="0"/>
               </a:p>
             </p:txBody>
           </p:sp>
         </mc:Choice>
-        <mc:Fallback>
+        <mc:Fallback xmlns="">
           <p:sp>
             <p:nvSpPr>
               <p:cNvPr id="25" name="TextBox 24">
@@ -4829,7 +4829,7 @@
             </p:nvSpPr>
             <p:spPr>
               <a:xfrm>
-                <a:off x="6541008" y="2105874"/>
+                <a:off x="5354382" y="1756866"/>
                 <a:ext cx="1371599" cy="646331"/>
               </a:xfrm>
               <a:prstGeom prst="rect">
@@ -4838,7 +4838,7 @@
               <a:blipFill>
                 <a:blip r:embed="rId6"/>
                 <a:stretch>
-                  <a:fillRect l="-444" t="-3774" r="-2667"/>
+                  <a:fillRect l="-2667" t="-3774" r="-4889"/>
                 </a:stretch>
               </a:blipFill>
             </p:spPr>
@@ -4871,8 +4871,8 @@
         </p:nvSpPr>
         <p:spPr>
           <a:xfrm>
-            <a:off x="1972609" y="1458852"/>
-            <a:ext cx="4114800" cy="369775"/>
+            <a:off x="785983" y="1109844"/>
+            <a:ext cx="4114800" cy="461665"/>
           </a:xfrm>
           <a:prstGeom prst="rect">
             <a:avLst/>
@@ -4887,7 +4887,7 @@
           <a:p>
             <a:pPr algn="ctr"/>
             <a:r>
-              <a:rPr lang="en-US" b="1" dirty="0"/>
+              <a:rPr lang="en-US" sz="2400" b="1" dirty="0"/>
               <a:t>Scenario 1</a:t>
             </a:r>
           </a:p>
@@ -4907,8 +4907,8 @@
         </p:nvSpPr>
         <p:spPr>
           <a:xfrm>
-            <a:off x="6091903" y="1464014"/>
-            <a:ext cx="6039602" cy="369775"/>
+            <a:off x="4905277" y="1115006"/>
+            <a:ext cx="6039602" cy="461665"/>
           </a:xfrm>
           <a:prstGeom prst="rect">
             <a:avLst/>
@@ -4923,7 +4923,7 @@
           <a:p>
             <a:pPr algn="ctr"/>
             <a:r>
-              <a:rPr lang="en-US" b="1" dirty="0"/>
+              <a:rPr lang="en-US" sz="2400" b="1" dirty="0"/>
               <a:t>Scenario 2</a:t>
             </a:r>
           </a:p>
@@ -4961,10 +4961,10 @@
       </p:grpSpPr>
       <p:pic>
         <p:nvPicPr>
-          <p:cNvPr id="2" name="Picture 1">
-            <a:extLst>
-              <a:ext uri="{FF2B5EF4-FFF2-40B4-BE49-F238E27FC236}">
-                <a16:creationId xmlns:a16="http://schemas.microsoft.com/office/drawing/2014/main" id="{921A265C-B563-5C51-ABA3-95A0B29AC79E}"/>
+          <p:cNvPr id="3" name="Picture 2">
+            <a:extLst>
+              <a:ext uri="{FF2B5EF4-FFF2-40B4-BE49-F238E27FC236}">
+                <a16:creationId xmlns:a16="http://schemas.microsoft.com/office/drawing/2014/main" id="{B9FF26FA-195E-E154-BD2D-E1C1F0F2923B}"/>
               </a:ext>
             </a:extLst>
           </p:cNvPr>
@@ -4981,8 +4981,8 @@
         </p:blipFill>
         <p:spPr>
           <a:xfrm>
-            <a:off x="1008447" y="1868288"/>
-            <a:ext cx="10175106" cy="3121423"/>
+            <a:off x="999302" y="1856095"/>
+            <a:ext cx="10193395" cy="3145809"/>
           </a:xfrm>
           <a:prstGeom prst="rect">
             <a:avLst/>

</xml_diff>